<commit_message>
ajout titres wireframe et supression version précédente odp
</commit_message>
<xml_diff>
--- a/doc/wireframe/Présentation1.pptx
+++ b/doc/wireframe/Présentation1.pptx
@@ -121,6 +121,7 @@
 <p1510:revInfo xmlns:a="http://schemas.openxmlformats.org/drawingml/2006/main" xmlns:r="http://schemas.openxmlformats.org/officeDocument/2006/relationships" xmlns:p1510="http://schemas.microsoft.com/office/powerpoint/2015/10/main">
   <p1510:revLst>
     <p1510:client id="{05939642-790B-4EEE-A258-B9C88DBD621C}" v="859" dt="2024-01-07T02:02:47.260"/>
+    <p1510:client id="{5A551BBF-0E8A-7CE2-29B5-3E0C4E66BFB2}" v="294" dt="2024-01-07T15:52:18.918"/>
     <p1510:client id="{5E31DEA4-3EE3-7F7E-6F8D-5E6B70B897E0}" v="1514" dt="2024-01-07T10:30:12.915"/>
   </p1510:revLst>
 </p1510:revInfo>
@@ -3669,6 +3670,59 @@
           </a:p>
         </p:txBody>
       </p:sp>
+      <p:sp>
+        <p:nvSpPr>
+          <p:cNvPr id="2" name="ZoneTexte 1">
+            <a:extLst>
+              <a:ext uri="{FF2B5EF4-FFF2-40B4-BE49-F238E27FC236}">
+                <a16:creationId xmlns:a16="http://schemas.microsoft.com/office/drawing/2014/main" id="{920DB091-382E-5F7D-8924-3A09EEB1A901}"/>
+              </a:ext>
+            </a:extLst>
+          </p:cNvPr>
+          <p:cNvSpPr txBox="1"/>
+          <p:nvPr/>
+        </p:nvSpPr>
+        <p:spPr>
+          <a:xfrm>
+            <a:off x="4189458" y="16524986"/>
+            <a:ext cx="9890831" cy="1292662"/>
+          </a:xfrm>
+          <a:prstGeom prst="rect">
+            <a:avLst/>
+          </a:prstGeom>
+          <a:noFill/>
+        </p:spPr>
+        <p:txBody>
+          <a:bodyPr rot="0" spcFirstLastPara="0" vertOverflow="overflow" horzOverflow="overflow" vert="horz" wrap="square" lIns="91440" tIns="45720" rIns="91440" bIns="45720" numCol="1" spcCol="0" rtlCol="0" fromWordArt="0" anchor="t" anchorCtr="0" forceAA="0" compatLnSpc="1">
+            <a:prstTxWarp prst="textNoShape">
+              <a:avLst/>
+            </a:prstTxWarp>
+            <a:spAutoFit/>
+          </a:bodyPr>
+          <a:lstStyle/>
+          <a:p>
+            <a:pPr algn="ctr"/>
+            <a:r>
+              <a:rPr lang="fr-FR" sz="6000" b="1" dirty="0">
+                <a:ea typeface="+mn-lt"/>
+                <a:cs typeface="+mn-lt"/>
+              </a:rPr>
+              <a:t>Page principale</a:t>
+            </a:r>
+            <a:endParaRPr lang="fr-FR" sz="6000" b="1" dirty="0">
+              <a:ea typeface="Calibri"/>
+              <a:cs typeface="Calibri"/>
+            </a:endParaRPr>
+          </a:p>
+          <a:p>
+            <a:pPr algn="l"/>
+            <a:endParaRPr lang="fr-FR" dirty="0">
+              <a:ea typeface="Calibri"/>
+              <a:cs typeface="Calibri"/>
+            </a:endParaRPr>
+          </a:p>
+        </p:txBody>
+      </p:sp>
     </p:spTree>
     <p:extLst>
       <p:ext uri="{BB962C8B-B14F-4D97-AF65-F5344CB8AC3E}">
@@ -5732,6 +5786,56 @@
           </a:fontRef>
         </p:style>
       </p:cxnSp>
+      <p:sp>
+        <p:nvSpPr>
+          <p:cNvPr id="12" name="ZoneTexte 11">
+            <a:extLst>
+              <a:ext uri="{FF2B5EF4-FFF2-40B4-BE49-F238E27FC236}">
+                <a16:creationId xmlns:a16="http://schemas.microsoft.com/office/drawing/2014/main" id="{9257220F-6931-D0D3-7D68-D50C1766A315}"/>
+              </a:ext>
+            </a:extLst>
+          </p:cNvPr>
+          <p:cNvSpPr txBox="1"/>
+          <p:nvPr/>
+        </p:nvSpPr>
+        <p:spPr>
+          <a:xfrm>
+            <a:off x="4189458" y="16524986"/>
+            <a:ext cx="9890831" cy="1292662"/>
+          </a:xfrm>
+          <a:prstGeom prst="rect">
+            <a:avLst/>
+          </a:prstGeom>
+          <a:noFill/>
+        </p:spPr>
+        <p:txBody>
+          <a:bodyPr rot="0" spcFirstLastPara="0" vertOverflow="overflow" horzOverflow="overflow" vert="horz" wrap="square" lIns="91440" tIns="45720" rIns="91440" bIns="45720" numCol="1" spcCol="0" rtlCol="0" fromWordArt="0" anchor="t" anchorCtr="0" forceAA="0" compatLnSpc="1">
+            <a:prstTxWarp prst="textNoShape">
+              <a:avLst/>
+            </a:prstTxWarp>
+            <a:spAutoFit/>
+          </a:bodyPr>
+          <a:lstStyle/>
+          <a:p>
+            <a:pPr algn="ctr"/>
+            <a:r>
+              <a:rPr lang="fr-FR" sz="6000" b="1" dirty="0">
+                <a:ea typeface="+mn-lt"/>
+                <a:cs typeface="+mn-lt"/>
+              </a:rPr>
+              <a:t>Recommandations</a:t>
+            </a:r>
+            <a:endParaRPr lang="fr-FR" dirty="0"/>
+          </a:p>
+          <a:p>
+            <a:pPr algn="l"/>
+            <a:endParaRPr lang="fr-FR" dirty="0">
+              <a:ea typeface="Calibri"/>
+              <a:cs typeface="Calibri"/>
+            </a:endParaRPr>
+          </a:p>
+        </p:txBody>
+      </p:sp>
     </p:spTree>
     <p:extLst>
       <p:ext uri="{BB962C8B-B14F-4D97-AF65-F5344CB8AC3E}">
@@ -7393,6 +7497,56 @@
           </a:p>
         </p:txBody>
       </p:sp>
+      <p:sp>
+        <p:nvSpPr>
+          <p:cNvPr id="12" name="ZoneTexte 11">
+            <a:extLst>
+              <a:ext uri="{FF2B5EF4-FFF2-40B4-BE49-F238E27FC236}">
+                <a16:creationId xmlns:a16="http://schemas.microsoft.com/office/drawing/2014/main" id="{09DF2B0F-3BA7-9BA6-B8AB-A8D6CEC0FC04}"/>
+              </a:ext>
+            </a:extLst>
+          </p:cNvPr>
+          <p:cNvSpPr txBox="1"/>
+          <p:nvPr/>
+        </p:nvSpPr>
+        <p:spPr>
+          <a:xfrm>
+            <a:off x="4189458" y="16524986"/>
+            <a:ext cx="9890831" cy="1292662"/>
+          </a:xfrm>
+          <a:prstGeom prst="rect">
+            <a:avLst/>
+          </a:prstGeom>
+          <a:noFill/>
+        </p:spPr>
+        <p:txBody>
+          <a:bodyPr rot="0" spcFirstLastPara="0" vertOverflow="overflow" horzOverflow="overflow" vert="horz" wrap="square" lIns="91440" tIns="45720" rIns="91440" bIns="45720" numCol="1" spcCol="0" rtlCol="0" fromWordArt="0" anchor="t" anchorCtr="0" forceAA="0" compatLnSpc="1">
+            <a:prstTxWarp prst="textNoShape">
+              <a:avLst/>
+            </a:prstTxWarp>
+            <a:spAutoFit/>
+          </a:bodyPr>
+          <a:lstStyle/>
+          <a:p>
+            <a:pPr algn="ctr"/>
+            <a:r>
+              <a:rPr lang="fr-FR" sz="6000" b="1" dirty="0">
+                <a:ea typeface="+mn-lt"/>
+                <a:cs typeface="+mn-lt"/>
+              </a:rPr>
+              <a:t>Historique et bilan carbone</a:t>
+            </a:r>
+            <a:endParaRPr lang="fr-FR" dirty="0"/>
+          </a:p>
+          <a:p>
+            <a:pPr algn="l"/>
+            <a:endParaRPr lang="fr-FR" dirty="0">
+              <a:ea typeface="Calibri"/>
+              <a:cs typeface="Calibri"/>
+            </a:endParaRPr>
+          </a:p>
+        </p:txBody>
+      </p:sp>
     </p:spTree>
     <p:extLst>
       <p:ext uri="{BB962C8B-B14F-4D97-AF65-F5344CB8AC3E}">
@@ -9241,6 +9395,56 @@
           </a:p>
         </p:txBody>
       </p:sp>
+      <p:sp>
+        <p:nvSpPr>
+          <p:cNvPr id="14" name="ZoneTexte 13">
+            <a:extLst>
+              <a:ext uri="{FF2B5EF4-FFF2-40B4-BE49-F238E27FC236}">
+                <a16:creationId xmlns:a16="http://schemas.microsoft.com/office/drawing/2014/main" id="{323C0279-6397-7ED9-3A1A-834B378B4015}"/>
+              </a:ext>
+            </a:extLst>
+          </p:cNvPr>
+          <p:cNvSpPr txBox="1"/>
+          <p:nvPr/>
+        </p:nvSpPr>
+        <p:spPr>
+          <a:xfrm>
+            <a:off x="4189458" y="16524986"/>
+            <a:ext cx="9890831" cy="1292662"/>
+          </a:xfrm>
+          <a:prstGeom prst="rect">
+            <a:avLst/>
+          </a:prstGeom>
+          <a:noFill/>
+        </p:spPr>
+        <p:txBody>
+          <a:bodyPr rot="0" spcFirstLastPara="0" vertOverflow="overflow" horzOverflow="overflow" vert="horz" wrap="square" lIns="91440" tIns="45720" rIns="91440" bIns="45720" numCol="1" spcCol="0" rtlCol="0" fromWordArt="0" anchor="t" anchorCtr="0" forceAA="0" compatLnSpc="1">
+            <a:prstTxWarp prst="textNoShape">
+              <a:avLst/>
+            </a:prstTxWarp>
+            <a:spAutoFit/>
+          </a:bodyPr>
+          <a:lstStyle/>
+          <a:p>
+            <a:pPr algn="ctr"/>
+            <a:r>
+              <a:rPr lang="fr-FR" sz="6000" b="1" dirty="0">
+                <a:ea typeface="+mn-lt"/>
+                <a:cs typeface="+mn-lt"/>
+              </a:rPr>
+              <a:t>Signaler point collecte </a:t>
+            </a:r>
+            <a:endParaRPr lang="fr-FR" dirty="0"/>
+          </a:p>
+          <a:p>
+            <a:pPr algn="l"/>
+            <a:endParaRPr lang="fr-FR" dirty="0">
+              <a:ea typeface="Calibri"/>
+              <a:cs typeface="Calibri"/>
+            </a:endParaRPr>
+          </a:p>
+        </p:txBody>
+      </p:sp>
     </p:spTree>
     <p:extLst>
       <p:ext uri="{BB962C8B-B14F-4D97-AF65-F5344CB8AC3E}">
@@ -10004,9 +10208,9 @@
                 <a:ea typeface="+mn-lt"/>
                 <a:cs typeface="+mn-lt"/>
               </a:rPr>
-              <a:t>Signaler point de collecte :</a:t>
-            </a:r>
-            <a:endParaRPr lang="fr-FR" sz="3600">
+              <a:t>Signaler point de dépôt : </a:t>
+            </a:r>
+            <a:endParaRPr lang="fr-FR" sz="3600" dirty="0">
               <a:cs typeface="Calibri" panose="020F0502020204030204"/>
             </a:endParaRPr>
           </a:p>
@@ -11091,6 +11295,59 @@
               <a:t>Types pris en charge :</a:t>
             </a:r>
             <a:endParaRPr lang="fr-FR" dirty="0"/>
+          </a:p>
+          <a:p>
+            <a:pPr algn="l"/>
+            <a:endParaRPr lang="fr-FR" dirty="0">
+              <a:ea typeface="Calibri"/>
+              <a:cs typeface="Calibri"/>
+            </a:endParaRPr>
+          </a:p>
+        </p:txBody>
+      </p:sp>
+      <p:sp>
+        <p:nvSpPr>
+          <p:cNvPr id="14" name="ZoneTexte 13">
+            <a:extLst>
+              <a:ext uri="{FF2B5EF4-FFF2-40B4-BE49-F238E27FC236}">
+                <a16:creationId xmlns:a16="http://schemas.microsoft.com/office/drawing/2014/main" id="{ABF5ADD5-632F-E012-A440-7EB540B6C062}"/>
+              </a:ext>
+            </a:extLst>
+          </p:cNvPr>
+          <p:cNvSpPr txBox="1"/>
+          <p:nvPr/>
+        </p:nvSpPr>
+        <p:spPr>
+          <a:xfrm>
+            <a:off x="4189458" y="16524986"/>
+            <a:ext cx="9890831" cy="1292662"/>
+          </a:xfrm>
+          <a:prstGeom prst="rect">
+            <a:avLst/>
+          </a:prstGeom>
+          <a:noFill/>
+        </p:spPr>
+        <p:txBody>
+          <a:bodyPr rot="0" spcFirstLastPara="0" vertOverflow="overflow" horzOverflow="overflow" vert="horz" wrap="square" lIns="91440" tIns="45720" rIns="91440" bIns="45720" numCol="1" spcCol="0" rtlCol="0" fromWordArt="0" anchor="t" anchorCtr="0" forceAA="0" compatLnSpc="1">
+            <a:prstTxWarp prst="textNoShape">
+              <a:avLst/>
+            </a:prstTxWarp>
+            <a:spAutoFit/>
+          </a:bodyPr>
+          <a:lstStyle/>
+          <a:p>
+            <a:pPr algn="ctr"/>
+            <a:r>
+              <a:rPr lang="fr-FR" sz="6000" b="1" dirty="0">
+                <a:ea typeface="+mn-lt"/>
+                <a:cs typeface="+mn-lt"/>
+              </a:rPr>
+              <a:t>Signaler point dépôt</a:t>
+            </a:r>
+            <a:endParaRPr lang="fr-FR" dirty="0">
+              <a:ea typeface="Calibri"/>
+              <a:cs typeface="Calibri"/>
+            </a:endParaRPr>
           </a:p>
           <a:p>
             <a:pPr algn="l"/>
@@ -12794,6 +13051,55 @@
           <a:p>
             <a:pPr algn="ctr"/>
             <a:endParaRPr lang="fr-FR"/>
+          </a:p>
+        </p:txBody>
+      </p:sp>
+      <p:sp>
+        <p:nvSpPr>
+          <p:cNvPr id="14" name="ZoneTexte 13">
+            <a:extLst>
+              <a:ext uri="{FF2B5EF4-FFF2-40B4-BE49-F238E27FC236}">
+                <a16:creationId xmlns:a16="http://schemas.microsoft.com/office/drawing/2014/main" id="{A58134C8-0613-3EAF-ECC6-7D25B0C3C9A7}"/>
+              </a:ext>
+            </a:extLst>
+          </p:cNvPr>
+          <p:cNvSpPr txBox="1"/>
+          <p:nvPr/>
+        </p:nvSpPr>
+        <p:spPr>
+          <a:xfrm>
+            <a:off x="4189458" y="16524986"/>
+            <a:ext cx="9890831" cy="1292662"/>
+          </a:xfrm>
+          <a:prstGeom prst="rect">
+            <a:avLst/>
+          </a:prstGeom>
+          <a:noFill/>
+        </p:spPr>
+        <p:txBody>
+          <a:bodyPr rot="0" spcFirstLastPara="0" vertOverflow="overflow" horzOverflow="overflow" vert="horz" wrap="square" lIns="91440" tIns="45720" rIns="91440" bIns="45720" numCol="1" spcCol="0" rtlCol="0" fromWordArt="0" anchor="t" anchorCtr="0" forceAA="0" compatLnSpc="1">
+            <a:prstTxWarp prst="textNoShape">
+              <a:avLst/>
+            </a:prstTxWarp>
+            <a:spAutoFit/>
+          </a:bodyPr>
+          <a:lstStyle/>
+          <a:p>
+            <a:pPr algn="ctr"/>
+            <a:r>
+              <a:rPr lang="fr-FR" sz="6000" b="1" dirty="0">
+                <a:ea typeface="Calibri"/>
+                <a:cs typeface="Calibri"/>
+              </a:rPr>
+              <a:t>Recherche points de dépôt </a:t>
+            </a:r>
+          </a:p>
+          <a:p>
+            <a:pPr algn="l"/>
+            <a:endParaRPr lang="fr-FR" dirty="0">
+              <a:ea typeface="Calibri"/>
+              <a:cs typeface="Calibri"/>
+            </a:endParaRPr>
           </a:p>
         </p:txBody>
       </p:sp>

</xml_diff>

<commit_message>
maj orga et tech doc
</commit_message>
<xml_diff>
--- a/doc/wireframe/Présentation1.pptx
+++ b/doc/wireframe/Présentation1.pptx
@@ -7357,8 +7357,8 @@
         </p:nvSpPr>
         <p:spPr>
           <a:xfrm>
-            <a:off x="2990773" y="872698"/>
-            <a:ext cx="1826967" cy="1015663"/>
+            <a:off x="3426352" y="664980"/>
+            <a:ext cx="1391388" cy="1169551"/>
           </a:xfrm>
           <a:prstGeom prst="rect">
             <a:avLst/>
@@ -9085,8 +9085,8 @@
         </p:nvSpPr>
         <p:spPr>
           <a:xfrm>
-            <a:off x="15177415" y="6711017"/>
-            <a:ext cx="2587601" cy="553998"/>
+            <a:off x="15156570" y="6342968"/>
+            <a:ext cx="1156753" cy="1323439"/>
           </a:xfrm>
           <a:prstGeom prst="rect">
             <a:avLst/>
@@ -9821,7 +9821,7 @@
         <p:spPr>
           <a:xfrm>
             <a:off x="14874132" y="10720833"/>
-            <a:ext cx="2587601" cy="400110"/>
+            <a:ext cx="1150885" cy="861774"/>
           </a:xfrm>
           <a:prstGeom prst="rect">
             <a:avLst/>

</xml_diff>